<commit_message>
Update course work. Add Genetic algoritm
</commit_message>
<xml_diff>
--- a/Gvozdev_Zolin_Khlamkin.pptx
+++ b/Gvozdev_Zolin_Khlamkin.pptx
@@ -253,7 +253,7 @@
             <a:pPr rtl="0"/>
             <a:fld id="{42C48FB7-4632-4FB7-A822-C8EE7A1BCE57}" type="datetime1">
               <a:rPr lang="ru-RU" smtClean="0"/>
-              <a:t>28.11.2022</a:t>
+              <a:t>29.11.2022</a:t>
             </a:fld>
             <a:endParaRPr lang="ru-RU" dirty="0"/>
           </a:p>
@@ -434,7 +434,7 @@
             <a:fld id="{A397D626-816E-4770-8022-B9B504B09470}" type="datetime1">
               <a:rPr lang="ru-RU" smtClean="0"/>
               <a:pPr/>
-              <a:t>28.11.2022</a:t>
+              <a:t>29.11.2022</a:t>
             </a:fld>
             <a:endParaRPr lang="ru-RU" dirty="0"/>
           </a:p>
@@ -16740,7 +16740,10 @@
           <a:p>
             <a:pPr rtl="0"/>
             <a:r>
-              <a:rPr lang="ru-RU" sz="2800" cap="none" dirty="0"/>
+              <a:rPr lang="ru-RU" sz="2800" cap="none" dirty="0">
+                <a:latin typeface="Garamond" panose="02020404030301010803" pitchFamily="18" charset="0"/>
+                <a:cs typeface="Arial" panose="020B0604020202020204" pitchFamily="34" charset="0"/>
+              </a:rPr>
               <a:t>Сравнительный анализ реализации задачи коммивояжёра с усложнением</a:t>
             </a:r>
           </a:p>
@@ -16776,35 +16779,47 @@
           <a:p>
             <a:pPr rtl="0"/>
             <a:r>
-              <a:rPr lang="ru-RU" dirty="0"/>
+              <a:rPr lang="ru-RU" dirty="0">
+                <a:latin typeface="Garamond" panose="02020404030301010803" pitchFamily="18" charset="0"/>
+              </a:rPr>
               <a:t>Гвоздев Святослав</a:t>
             </a:r>
           </a:p>
           <a:p>
             <a:pPr rtl="0"/>
             <a:r>
-              <a:rPr lang="ru-RU" dirty="0"/>
+              <a:rPr lang="ru-RU" dirty="0">
+                <a:latin typeface="Garamond" panose="02020404030301010803" pitchFamily="18" charset="0"/>
+              </a:rPr>
               <a:t>Золин Иван</a:t>
             </a:r>
           </a:p>
           <a:p>
             <a:pPr rtl="0"/>
             <a:r>
-              <a:rPr lang="ru-RU" dirty="0"/>
+              <a:rPr lang="ru-RU" dirty="0">
+                <a:latin typeface="Garamond" panose="02020404030301010803" pitchFamily="18" charset="0"/>
+              </a:rPr>
               <a:t>Хламкин Евгений</a:t>
             </a:r>
           </a:p>
           <a:p>
             <a:r>
-              <a:rPr lang="ru-RU" dirty="0"/>
+              <a:rPr lang="ru-RU" dirty="0">
+                <a:latin typeface="Garamond" panose="02020404030301010803" pitchFamily="18" charset="0"/>
+              </a:rPr>
               <a:t>Группа: 5030102</a:t>
             </a:r>
             <a:r>
-              <a:rPr lang="en-US" dirty="0"/>
+              <a:rPr lang="en-US" dirty="0">
+                <a:latin typeface="Garamond" panose="02020404030301010803" pitchFamily="18" charset="0"/>
+              </a:rPr>
               <a:t>/0</a:t>
             </a:r>
             <a:r>
-              <a:rPr lang="ru-RU" dirty="0"/>
+              <a:rPr lang="ru-RU" dirty="0">
+                <a:latin typeface="Garamond" panose="02020404030301010803" pitchFamily="18" charset="0"/>
+              </a:rPr>
               <a:t>0201</a:t>
             </a:r>
           </a:p>
@@ -16900,8 +16915,10 @@
           <a:lstStyle/>
           <a:p>
             <a:r>
-              <a:rPr lang="ru-RU" cap="none" dirty="0"/>
-              <a:t>Алгоритм</a:t>
+              <a:rPr lang="ru-RU" cap="none" dirty="0">
+                <a:latin typeface="Garamond" panose="02020404030301010803" pitchFamily="18" charset="0"/>
+              </a:rPr>
+              <a:t>Генетический алгоритм</a:t>
             </a:r>
           </a:p>
         </p:txBody>
@@ -17079,7 +17096,9 @@
           <a:p>
             <a:pPr rtl="0"/>
             <a:r>
-              <a:rPr lang="ru-RU" cap="none" dirty="0"/>
+              <a:rPr lang="ru-RU" cap="none" dirty="0">
+                <a:latin typeface="Garamond" panose="02020404030301010803" pitchFamily="18" charset="0"/>
+              </a:rPr>
               <a:t>Сравнение алгоритмов</a:t>
             </a:r>
           </a:p>
@@ -20501,7 +20520,9 @@
           <a:p>
             <a:pPr rtl="0"/>
             <a:r>
-              <a:rPr lang="ru-RU" cap="none" dirty="0"/>
+              <a:rPr lang="ru-RU" cap="none" dirty="0">
+                <a:latin typeface="Garamond" panose="02020404030301010803" pitchFamily="18" charset="0"/>
+              </a:rPr>
               <a:t>Краткие итоги</a:t>
             </a:r>
           </a:p>
@@ -20819,7 +20840,9 @@
           <a:p>
             <a:pPr rtl="0"/>
             <a:r>
-              <a:rPr lang="ru-RU" cap="none" dirty="0"/>
+              <a:rPr lang="ru-RU" cap="none" dirty="0">
+                <a:latin typeface="Garamond" panose="02020404030301010803" pitchFamily="18" charset="0"/>
+              </a:rPr>
               <a:t>Список литературы</a:t>
             </a:r>
           </a:p>
@@ -20849,7 +20872,7 @@
         </p:spPr>
         <p:txBody>
           <a:bodyPr vert="horz" lIns="91440" tIns="45720" rIns="91440" bIns="45720" rtlCol="0" anchor="b">
-            <a:normAutofit fontScale="85000" lnSpcReduction="10000"/>
+            <a:normAutofit fontScale="92500" lnSpcReduction="20000"/>
           </a:bodyPr>
           <a:lstStyle/>
           <a:p>
@@ -20863,6 +20886,7 @@
                   <a:srgbClr val="172B4D"/>
                 </a:solidFill>
                 <a:effectLst/>
+                <a:latin typeface="Garamond" panose="02020404030301010803" pitchFamily="18" charset="0"/>
               </a:rPr>
               <a:t>Володина Е.В. Практическое применение алгоритма решения</a:t>
             </a:r>
@@ -20872,6 +20896,7 @@
                   <a:srgbClr val="172B4D"/>
                 </a:solidFill>
                 <a:effectLst/>
+                <a:latin typeface="Garamond" panose="02020404030301010803" pitchFamily="18" charset="0"/>
               </a:rPr>
             </a:br>
             <a:r>
@@ -20880,6 +20905,7 @@
                   <a:srgbClr val="172B4D"/>
                 </a:solidFill>
                 <a:effectLst/>
+                <a:latin typeface="Garamond" panose="02020404030301010803" pitchFamily="18" charset="0"/>
               </a:rPr>
               <a:t>задачи коммивояжера/ Е.В. Володина, Е.А. Студентов</a:t>
             </a:r>
@@ -20895,6 +20921,7 @@
                   <a:srgbClr val="172B4D"/>
                 </a:solidFill>
                 <a:effectLst/>
+                <a:latin typeface="Garamond" panose="02020404030301010803" pitchFamily="18" charset="0"/>
               </a:rPr>
               <a:t>Громкович</a:t>
             </a:r>
@@ -20904,6 +20931,7 @@
                   <a:srgbClr val="172B4D"/>
                 </a:solidFill>
                 <a:effectLst/>
+                <a:latin typeface="Garamond" panose="02020404030301010803" pitchFamily="18" charset="0"/>
               </a:rPr>
               <a:t> Ю. Алгоритмизация </a:t>
             </a:r>
@@ -20913,6 +20941,7 @@
                   <a:srgbClr val="172B4D"/>
                 </a:solidFill>
                 <a:effectLst/>
+                <a:latin typeface="Garamond" panose="02020404030301010803" pitchFamily="18" charset="0"/>
               </a:rPr>
               <a:t>труднорешаемых</a:t>
             </a:r>
@@ -20922,6 +20951,7 @@
                   <a:srgbClr val="172B4D"/>
                 </a:solidFill>
                 <a:effectLst/>
+                <a:latin typeface="Garamond" panose="02020404030301010803" pitchFamily="18" charset="0"/>
               </a:rPr>
               <a:t> задач. Часть I.</a:t>
             </a:r>
@@ -20931,6 +20961,7 @@
                   <a:srgbClr val="172B4D"/>
                 </a:solidFill>
                 <a:effectLst/>
+                <a:latin typeface="Garamond" panose="02020404030301010803" pitchFamily="18" charset="0"/>
               </a:rPr>
             </a:br>
             <a:r>
@@ -20939,6 +20970,7 @@
                   <a:srgbClr val="172B4D"/>
                 </a:solidFill>
                 <a:effectLst/>
+                <a:latin typeface="Garamond" panose="02020404030301010803" pitchFamily="18" charset="0"/>
               </a:rPr>
               <a:t>Простые примеры и простые эвристики / Ю. </a:t>
             </a:r>
@@ -20948,6 +20980,7 @@
                   <a:srgbClr val="172B4D"/>
                 </a:solidFill>
                 <a:effectLst/>
+                <a:latin typeface="Garamond" panose="02020404030301010803" pitchFamily="18" charset="0"/>
               </a:rPr>
               <a:t>Громкович</a:t>
             </a:r>
@@ -20957,6 +20990,7 @@
                   <a:srgbClr val="172B4D"/>
                 </a:solidFill>
                 <a:effectLst/>
+                <a:latin typeface="Garamond" panose="02020404030301010803" pitchFamily="18" charset="0"/>
               </a:rPr>
               <a:t>, </a:t>
             </a:r>
@@ -20966,6 +21000,7 @@
                   <a:srgbClr val="172B4D"/>
                 </a:solidFill>
                 <a:effectLst/>
+                <a:latin typeface="Garamond" panose="02020404030301010803" pitchFamily="18" charset="0"/>
               </a:rPr>
               <a:t>Б.Ф.Мельников</a:t>
             </a:r>
@@ -20974,6 +21009,7 @@
                 <a:srgbClr val="172B4D"/>
               </a:solidFill>
               <a:effectLst/>
+              <a:latin typeface="Garamond" panose="02020404030301010803" pitchFamily="18" charset="0"/>
             </a:endParaRPr>
           </a:p>
           <a:p>
@@ -20987,6 +21023,7 @@
                   <a:srgbClr val="172B4D"/>
                 </a:solidFill>
                 <a:effectLst/>
+                <a:latin typeface="Garamond" panose="02020404030301010803" pitchFamily="18" charset="0"/>
               </a:rPr>
               <a:t>Громкович</a:t>
             </a:r>
@@ -20996,6 +21033,7 @@
                   <a:srgbClr val="172B4D"/>
                 </a:solidFill>
                 <a:effectLst/>
+                <a:latin typeface="Garamond" panose="02020404030301010803" pitchFamily="18" charset="0"/>
               </a:rPr>
               <a:t> Ю. Алгоритмизация </a:t>
             </a:r>
@@ -21005,6 +21043,7 @@
                   <a:srgbClr val="172B4D"/>
                 </a:solidFill>
                 <a:effectLst/>
+                <a:latin typeface="Garamond" panose="02020404030301010803" pitchFamily="18" charset="0"/>
               </a:rPr>
               <a:t>труднорешаемых</a:t>
             </a:r>
@@ -21014,6 +21053,7 @@
                   <a:srgbClr val="172B4D"/>
                 </a:solidFill>
                 <a:effectLst/>
+                <a:latin typeface="Garamond" panose="02020404030301010803" pitchFamily="18" charset="0"/>
               </a:rPr>
               <a:t> задач. Часть II.</a:t>
             </a:r>
@@ -21023,6 +21063,7 @@
                   <a:srgbClr val="172B4D"/>
                 </a:solidFill>
                 <a:effectLst/>
+                <a:latin typeface="Garamond" panose="02020404030301010803" pitchFamily="18" charset="0"/>
               </a:rPr>
             </a:br>
             <a:r>
@@ -21031,6 +21072,7 @@
                   <a:srgbClr val="172B4D"/>
                 </a:solidFill>
                 <a:effectLst/>
+                <a:latin typeface="Garamond" panose="02020404030301010803" pitchFamily="18" charset="0"/>
               </a:rPr>
               <a:t>Более сложные эвристики. / Ю. </a:t>
             </a:r>
@@ -21040,6 +21082,7 @@
                   <a:srgbClr val="172B4D"/>
                 </a:solidFill>
                 <a:effectLst/>
+                <a:latin typeface="Garamond" panose="02020404030301010803" pitchFamily="18" charset="0"/>
               </a:rPr>
               <a:t>Громкович</a:t>
             </a:r>
@@ -21049,6 +21092,7 @@
                   <a:srgbClr val="172B4D"/>
                 </a:solidFill>
                 <a:effectLst/>
+                <a:latin typeface="Garamond" panose="02020404030301010803" pitchFamily="18" charset="0"/>
               </a:rPr>
               <a:t>, </a:t>
             </a:r>
@@ -21058,6 +21102,7 @@
                   <a:srgbClr val="172B4D"/>
                 </a:solidFill>
                 <a:effectLst/>
+                <a:latin typeface="Garamond" panose="02020404030301010803" pitchFamily="18" charset="0"/>
               </a:rPr>
               <a:t>Б.Ф.Мельников</a:t>
             </a:r>
@@ -21066,6 +21111,7 @@
                 <a:srgbClr val="172B4D"/>
               </a:solidFill>
               <a:effectLst/>
+              <a:latin typeface="Garamond" panose="02020404030301010803" pitchFamily="18" charset="0"/>
             </a:endParaRPr>
           </a:p>
           <a:p>
@@ -21079,6 +21125,7 @@
                   <a:srgbClr val="172B4D"/>
                 </a:solidFill>
                 <a:effectLst/>
+                <a:latin typeface="Garamond" panose="02020404030301010803" pitchFamily="18" charset="0"/>
               </a:rPr>
               <a:t>Гудман С. Введение в разработку и анализ алгоритмов: учебное</a:t>
             </a:r>
@@ -21088,6 +21135,7 @@
                   <a:srgbClr val="172B4D"/>
                 </a:solidFill>
                 <a:effectLst/>
+                <a:latin typeface="Garamond" panose="02020404030301010803" pitchFamily="18" charset="0"/>
               </a:rPr>
             </a:br>
             <a:r>
@@ -21096,6 +21144,7 @@
                   <a:srgbClr val="172B4D"/>
                 </a:solidFill>
                 <a:effectLst/>
+                <a:latin typeface="Garamond" panose="02020404030301010803" pitchFamily="18" charset="0"/>
               </a:rPr>
               <a:t>пособие / С. Гудман, С. </a:t>
             </a:r>
@@ -21105,6 +21154,7 @@
                   <a:srgbClr val="172B4D"/>
                 </a:solidFill>
                 <a:effectLst/>
+                <a:latin typeface="Garamond" panose="02020404030301010803" pitchFamily="18" charset="0"/>
               </a:rPr>
               <a:t>Хидетниеми</a:t>
             </a:r>
@@ -21113,6 +21163,7 @@
                 <a:srgbClr val="172B4D"/>
               </a:solidFill>
               <a:effectLst/>
+              <a:latin typeface="Garamond" panose="02020404030301010803" pitchFamily="18" charset="0"/>
             </a:endParaRPr>
           </a:p>
           <a:p>
@@ -21126,6 +21177,7 @@
                   <a:srgbClr val="172B4D"/>
                 </a:solidFill>
                 <a:effectLst/>
+                <a:latin typeface="Garamond" panose="02020404030301010803" pitchFamily="18" charset="0"/>
               </a:rPr>
               <a:t>Дулькейт</a:t>
             </a:r>
@@ -21135,6 +21187,7 @@
                   <a:srgbClr val="172B4D"/>
                 </a:solidFill>
                 <a:effectLst/>
+                <a:latin typeface="Garamond" panose="02020404030301010803" pitchFamily="18" charset="0"/>
               </a:rPr>
               <a:t> В.И. Приближённое решение задачи коммивояжера</a:t>
             </a:r>
@@ -21144,6 +21197,7 @@
                   <a:srgbClr val="172B4D"/>
                 </a:solidFill>
                 <a:effectLst/>
+                <a:latin typeface="Garamond" panose="02020404030301010803" pitchFamily="18" charset="0"/>
               </a:rPr>
             </a:br>
             <a:r>
@@ -21152,6 +21206,7 @@
                   <a:srgbClr val="172B4D"/>
                 </a:solidFill>
                 <a:effectLst/>
+                <a:latin typeface="Garamond" panose="02020404030301010803" pitchFamily="18" charset="0"/>
               </a:rPr>
               <a:t>методов рекурсивного построения вспомогательной кривой</a:t>
             </a:r>
@@ -21167,6 +21222,7 @@
                   <a:srgbClr val="172B4D"/>
                 </a:solidFill>
                 <a:effectLst/>
+                <a:latin typeface="Garamond" panose="02020404030301010803" pitchFamily="18" charset="0"/>
               </a:rPr>
               <a:t>Муравьиный алгоритм https://habr.com/ru/post/105302/</a:t>
             </a:r>
@@ -21182,6 +21238,7 @@
                   <a:srgbClr val="172B4D"/>
                 </a:solidFill>
                 <a:effectLst/>
+                <a:latin typeface="Garamond" panose="02020404030301010803" pitchFamily="18" charset="0"/>
               </a:rPr>
               <a:t>Муравьиный алгоритм(ч.2) </a:t>
             </a:r>
@@ -21191,6 +21248,7 @@
                   <a:srgbClr val="172B4D"/>
                 </a:solidFill>
                 <a:effectLst/>
+                <a:latin typeface="Garamond" panose="02020404030301010803" pitchFamily="18" charset="0"/>
               </a:rPr>
               <a:t>https://www.researchgate.net/publication/220203867_Ant_Algorithms_Theory_and_Applications</a:t>
             </a:r>
@@ -21199,6 +21257,7 @@
                 <a:srgbClr val="172B4D"/>
               </a:solidFill>
               <a:effectLst/>
+              <a:latin typeface="Garamond" panose="02020404030301010803" pitchFamily="18" charset="0"/>
             </a:endParaRPr>
           </a:p>
         </p:txBody>
@@ -21297,7 +21356,9 @@
           <a:p>
             <a:pPr rtl="0"/>
             <a:r>
-              <a:rPr lang="ru-RU" cap="none" dirty="0"/>
+              <a:rPr lang="ru-RU" cap="none" dirty="0">
+                <a:latin typeface="Garamond" panose="02020404030301010803" pitchFamily="18" charset="0"/>
+              </a:rPr>
               <a:t>Спасибо за внимание!</a:t>
             </a:r>
           </a:p>
@@ -21397,7 +21458,9 @@
           <a:p>
             <a:pPr rtl="0"/>
             <a:r>
-              <a:rPr lang="ru-RU" cap="none" dirty="0"/>
+              <a:rPr lang="ru-RU" cap="none" dirty="0">
+                <a:latin typeface="Garamond" panose="02020404030301010803" pitchFamily="18" charset="0"/>
+              </a:rPr>
               <a:t>План</a:t>
             </a:r>
           </a:p>
@@ -21433,7 +21496,9 @@
           <a:p>
             <a:pPr rtl="0"/>
             <a:r>
-              <a:rPr lang="ru-RU" cap="none" dirty="0"/>
+              <a:rPr lang="ru-RU" cap="none" dirty="0">
+                <a:latin typeface="Garamond" panose="02020404030301010803" pitchFamily="18" charset="0"/>
+              </a:rPr>
               <a:t>Постановка</a:t>
             </a:r>
           </a:p>
@@ -21458,7 +21523,7 @@
         <p:spPr>
           <a:xfrm>
             <a:off x="714375" y="2557463"/>
-            <a:ext cx="2141764" cy="514350"/>
+            <a:ext cx="1994319" cy="514350"/>
           </a:xfrm>
         </p:spPr>
         <p:txBody>
@@ -21467,7 +21532,9 @@
           <a:p>
             <a:pPr rtl="0"/>
             <a:r>
-              <a:rPr lang="ru-RU" cap="none" dirty="0"/>
+              <a:rPr lang="ru-RU" cap="none" dirty="0">
+                <a:latin typeface="Garamond" panose="02020404030301010803" pitchFamily="18" charset="0"/>
+              </a:rPr>
               <a:t>Формализация</a:t>
             </a:r>
           </a:p>
@@ -21491,8 +21558,8 @@
         </p:nvSpPr>
         <p:spPr>
           <a:xfrm>
-            <a:off x="1320800" y="3633788"/>
-            <a:ext cx="2141764" cy="514350"/>
+            <a:off x="508958" y="3633788"/>
+            <a:ext cx="2953606" cy="514350"/>
           </a:xfrm>
         </p:spPr>
         <p:txBody>
@@ -21501,7 +21568,9 @@
           <a:p>
             <a:pPr rtl="0"/>
             <a:r>
-              <a:rPr lang="ru-RU" cap="none" dirty="0"/>
+              <a:rPr lang="ru-RU" cap="none" dirty="0">
+                <a:latin typeface="Garamond" panose="02020404030301010803" pitchFamily="18" charset="0"/>
+              </a:rPr>
               <a:t>Алгоритмы и их сравнение</a:t>
             </a:r>
           </a:p>
@@ -21535,7 +21604,9 @@
           <a:p>
             <a:pPr rtl="0"/>
             <a:r>
-              <a:rPr lang="ru-RU" cap="none" dirty="0"/>
+              <a:rPr lang="ru-RU" cap="none" dirty="0">
+                <a:latin typeface="Garamond" panose="02020404030301010803" pitchFamily="18" charset="0"/>
+              </a:rPr>
               <a:t>Краткие итоги</a:t>
             </a:r>
           </a:p>
@@ -21569,7 +21640,9 @@
           <a:p>
             <a:pPr rtl="0"/>
             <a:r>
-              <a:rPr lang="ru-RU" dirty="0"/>
+              <a:rPr lang="ru-RU" dirty="0">
+                <a:latin typeface="Garamond" panose="02020404030301010803" pitchFamily="18" charset="0"/>
+              </a:rPr>
               <a:t>Описание задачи коммивояжёра с усложнением</a:t>
             </a:r>
           </a:p>
@@ -21598,7 +21671,7 @@
         <p:spPr>
           <a:xfrm>
             <a:off x="4986028" y="2682564"/>
-            <a:ext cx="5539095" cy="1010842"/>
+            <a:ext cx="5539095" cy="888772"/>
           </a:xfrm>
         </p:spPr>
         <p:txBody>
@@ -21607,7 +21680,9 @@
           <a:p>
             <a:pPr rtl="0"/>
             <a:r>
-              <a:rPr lang="ru-RU" dirty="0"/>
+              <a:rPr lang="ru-RU" dirty="0">
+                <a:latin typeface="Garamond" panose="02020404030301010803" pitchFamily="18" charset="0"/>
+              </a:rPr>
               <a:t>Приведение задачи в математический вид</a:t>
             </a:r>
           </a:p>
@@ -21635,13 +21710,13 @@
         </p:nvSpPr>
         <p:spPr>
           <a:xfrm>
-            <a:off x="5576937" y="3755394"/>
-            <a:ext cx="5539095" cy="1010842"/>
+            <a:off x="5576937" y="3571336"/>
+            <a:ext cx="5539095" cy="1194900"/>
           </a:xfrm>
         </p:spPr>
         <p:txBody>
           <a:bodyPr rtlCol="0">
-            <a:normAutofit fontScale="77500" lnSpcReduction="20000"/>
+            <a:normAutofit fontScale="70000" lnSpcReduction="20000"/>
           </a:bodyPr>
           <a:lstStyle/>
           <a:p>
@@ -21650,7 +21725,9 @@
               <a:buChar char="•"/>
             </a:pPr>
             <a:r>
-              <a:rPr lang="ru-RU" dirty="0"/>
+              <a:rPr lang="ru-RU" sz="2000" dirty="0">
+                <a:latin typeface="Garamond" panose="02020404030301010803" pitchFamily="18" charset="0"/>
+              </a:rPr>
               <a:t>Полный перебор</a:t>
             </a:r>
           </a:p>
@@ -21660,7 +21737,9 @@
               <a:buChar char="•"/>
             </a:pPr>
             <a:r>
-              <a:rPr lang="ru-RU" dirty="0"/>
+              <a:rPr lang="ru-RU" sz="2000" dirty="0">
+                <a:latin typeface="Garamond" panose="02020404030301010803" pitchFamily="18" charset="0"/>
+              </a:rPr>
               <a:t>Муравьиный алгоритм</a:t>
             </a:r>
           </a:p>
@@ -21670,7 +21749,9 @@
               <a:buChar char="•"/>
             </a:pPr>
             <a:r>
-              <a:rPr lang="ru-RU" dirty="0"/>
+              <a:rPr lang="ru-RU" sz="2000" dirty="0">
+                <a:latin typeface="Garamond" panose="02020404030301010803" pitchFamily="18" charset="0"/>
+              </a:rPr>
               <a:t>Алгоритм имитации отжига </a:t>
             </a:r>
           </a:p>
@@ -21680,7 +21761,9 @@
               <a:buChar char="•"/>
             </a:pPr>
             <a:r>
-              <a:rPr lang="ru-RU" dirty="0"/>
+              <a:rPr lang="ru-RU" sz="2000" dirty="0">
+                <a:latin typeface="Garamond" panose="02020404030301010803" pitchFamily="18" charset="0"/>
+              </a:rPr>
               <a:t>Алгоритм</a:t>
             </a:r>
           </a:p>
@@ -21718,7 +21801,9 @@
           <a:p>
             <a:pPr rtl="0"/>
             <a:r>
-              <a:rPr lang="ru-RU" dirty="0"/>
+              <a:rPr lang="ru-RU" dirty="0">
+                <a:latin typeface="Garamond" panose="02020404030301010803" pitchFamily="18" charset="0"/>
+              </a:rPr>
               <a:t>Анализ сравнённых алгоритмов и выводы по сделанным исследованиям</a:t>
             </a:r>
           </a:p>
@@ -21815,8 +21900,8 @@
         </p:nvSpPr>
         <p:spPr>
           <a:xfrm>
-            <a:off x="1333499" y="1020445"/>
-            <a:ext cx="3171825" cy="1325563"/>
+            <a:off x="1333499" y="1984076"/>
+            <a:ext cx="3171825" cy="543087"/>
           </a:xfrm>
         </p:spPr>
         <p:txBody>
@@ -21825,7 +21910,9 @@
           <a:p>
             <a:pPr rtl="0"/>
             <a:r>
-              <a:rPr lang="ru-RU" cap="none" dirty="0"/>
+              <a:rPr lang="ru-RU" cap="none" dirty="0">
+                <a:latin typeface="Garamond" panose="02020404030301010803" pitchFamily="18" charset="0"/>
+              </a:rPr>
               <a:t>Введение</a:t>
             </a:r>
           </a:p>
@@ -21852,13 +21939,13 @@
         </p:nvSpPr>
         <p:spPr>
           <a:xfrm>
-            <a:off x="1333499" y="2924175"/>
-            <a:ext cx="3643943" cy="3502504"/>
+            <a:off x="1333499" y="2872883"/>
+            <a:ext cx="4394441" cy="2950414"/>
           </a:xfrm>
         </p:spPr>
         <p:txBody>
           <a:bodyPr rtlCol="0">
-            <a:normAutofit fontScale="92500" lnSpcReduction="10000"/>
+            <a:normAutofit/>
           </a:bodyPr>
           <a:lstStyle/>
           <a:p>
@@ -21867,34 +21954,14 @@
               <a:buChar char="•"/>
             </a:pPr>
             <a:r>
-              <a:rPr lang="ru-RU" dirty="0"/>
-              <a:t>Задача коммивояжера (TSP -</a:t>
-            </a:r>
-            <a:r>
-              <a:rPr lang="ru-RU" dirty="0" err="1"/>
-              <a:t>Travelling</a:t>
-            </a:r>
-            <a:r>
-              <a:rPr lang="ru-RU" dirty="0"/>
-              <a:t> </a:t>
-            </a:r>
-            <a:r>
-              <a:rPr lang="ru-RU" dirty="0" err="1"/>
-              <a:t>Salesman</a:t>
-            </a:r>
-            <a:r>
-              <a:rPr lang="ru-RU" dirty="0"/>
-              <a:t> </a:t>
-            </a:r>
-            <a:r>
-              <a:rPr lang="ru-RU" dirty="0" err="1"/>
-              <a:t>Problem</a:t>
-            </a:r>
-            <a:r>
-              <a:rPr lang="ru-RU" dirty="0"/>
-              <a:t>) — одна из наиболее активно изучаемых задач вычислительной математики.</a:t>
-            </a:r>
-            <a:endParaRPr lang="en-US" dirty="0"/>
+              <a:rPr lang="ru-RU" dirty="0">
+                <a:latin typeface="Garamond" panose="02020404030301010803" pitchFamily="18" charset="0"/>
+              </a:rPr>
+              <a:t>Задача коммивояжера (TSP -Travelling Salesman Problem) — одна из наиболее активно изучаемых задач вычислительной математики.</a:t>
+            </a:r>
+            <a:endParaRPr lang="en-US" dirty="0">
+              <a:latin typeface="Garamond" panose="02020404030301010803" pitchFamily="18" charset="0"/>
+            </a:endParaRPr>
           </a:p>
           <a:p>
             <a:pPr marL="285750" indent="-285750" rtl="0">
@@ -21902,18 +21969,26 @@
               <a:buChar char="•"/>
             </a:pPr>
             <a:r>
-              <a:rPr lang="ru-RU" dirty="0"/>
+              <a:rPr lang="ru-RU" dirty="0">
+                <a:latin typeface="Garamond" panose="02020404030301010803" pitchFamily="18" charset="0"/>
+              </a:rPr>
               <a:t>Задача</a:t>
             </a:r>
             <a:r>
-              <a:rPr lang="en-US" dirty="0"/>
+              <a:rPr lang="en-US" dirty="0">
+                <a:latin typeface="Garamond" panose="02020404030301010803" pitchFamily="18" charset="0"/>
+              </a:rPr>
               <a:t> </a:t>
             </a:r>
             <a:r>
-              <a:rPr lang="ru-RU" dirty="0"/>
+              <a:rPr lang="ru-RU" dirty="0">
+                <a:latin typeface="Garamond" panose="02020404030301010803" pitchFamily="18" charset="0"/>
+              </a:rPr>
               <a:t>состоит в том, чтобы найти кратчайший путь , по которому коммивояжер должен пройти через список городов и вернуться в исходный город. </a:t>
             </a:r>
-            <a:endParaRPr lang="en-US" dirty="0"/>
+            <a:endParaRPr lang="en-US" dirty="0">
+              <a:latin typeface="Garamond" panose="02020404030301010803" pitchFamily="18" charset="0"/>
+            </a:endParaRPr>
           </a:p>
           <a:p>
             <a:pPr marL="285750" indent="-285750" rtl="0">
@@ -21921,10 +21996,14 @@
               <a:buChar char="•"/>
             </a:pPr>
             <a:r>
-              <a:rPr lang="ru-RU" dirty="0"/>
+              <a:rPr lang="ru-RU" dirty="0">
+                <a:latin typeface="Garamond" panose="02020404030301010803" pitchFamily="18" charset="0"/>
+              </a:rPr>
               <a:t>TSP полезен в различных приложениях в реальной жизни, таких как планирование или логистика.</a:t>
             </a:r>
-            <a:endParaRPr lang="en-US" dirty="0"/>
+            <a:endParaRPr lang="en-US" dirty="0">
+              <a:latin typeface="Garamond" panose="02020404030301010803" pitchFamily="18" charset="0"/>
+            </a:endParaRPr>
           </a:p>
           <a:p>
             <a:pPr marL="285750" indent="-285750" rtl="0">
@@ -21932,7 +22011,9 @@
               <a:buChar char="•"/>
             </a:pPr>
             <a:r>
-              <a:rPr lang="ru-RU" dirty="0"/>
+              <a:rPr lang="ru-RU" dirty="0">
+                <a:latin typeface="Garamond" panose="02020404030301010803" pitchFamily="18" charset="0"/>
+              </a:rPr>
               <a:t>Это NP-сложная задача. </a:t>
             </a:r>
           </a:p>
@@ -22020,13 +22101,20 @@
             <p:ph type="title"/>
           </p:nvPr>
         </p:nvSpPr>
-        <p:spPr/>
+        <p:spPr>
+          <a:xfrm>
+            <a:off x="1333499" y="1647645"/>
+            <a:ext cx="3411029" cy="724242"/>
+          </a:xfrm>
+        </p:spPr>
         <p:txBody>
           <a:bodyPr/>
           <a:lstStyle/>
           <a:p>
             <a:r>
-              <a:rPr lang="ru-RU" cap="none" dirty="0"/>
+              <a:rPr lang="ru-RU" cap="none" dirty="0">
+                <a:latin typeface="Garamond" panose="02020404030301010803" pitchFamily="18" charset="0"/>
+              </a:rPr>
               <a:t>Постановка задачи</a:t>
             </a:r>
           </a:p>
@@ -22061,7 +22149,9 @@
           <a:lstStyle/>
           <a:p>
             <a:r>
-              <a:rPr lang="ru-RU" dirty="0"/>
+              <a:rPr lang="ru-RU" dirty="0">
+                <a:latin typeface="Garamond" panose="02020404030301010803" pitchFamily="18" charset="0"/>
+              </a:rPr>
               <a:t>Есть набор городов, каждый характеризуется рейтингом, за заданное время нужно обойти города &gt;= суммарного рейтинга</a:t>
             </a:r>
           </a:p>
@@ -22156,13 +22246,7 @@
             <a:pPr rtl="0"/>
             <a:r>
               <a:rPr lang="ru-RU" cap="none" dirty="0">
-                <a:effectLst>
-                  <a:outerShdw blurRad="38100" dist="38100" dir="2700000" algn="tl">
-                    <a:srgbClr val="000000">
-                      <a:alpha val="43137"/>
-                    </a:srgbClr>
-                  </a:outerShdw>
-                </a:effectLst>
+                <a:latin typeface="Garamond" panose="02020404030301010803" pitchFamily="18" charset="0"/>
               </a:rPr>
               <a:t>Формализация </a:t>
             </a:r>
@@ -22469,7 +22553,9 @@
           <a:lstStyle/>
           <a:p>
             <a:r>
-              <a:rPr lang="ru-RU" cap="none" dirty="0"/>
+              <a:rPr lang="ru-RU" cap="none" dirty="0">
+                <a:latin typeface="Garamond" panose="02020404030301010803" pitchFamily="18" charset="0"/>
+              </a:rPr>
               <a:t>Алгоритмы</a:t>
             </a:r>
           </a:p>
@@ -22569,7 +22655,9 @@
           <a:lstStyle/>
           <a:p>
             <a:r>
-              <a:rPr lang="ru-RU" dirty="0"/>
+              <a:rPr lang="ru-RU" dirty="0">
+                <a:latin typeface="Garamond" panose="02020404030301010803" pitchFamily="18" charset="0"/>
+              </a:rPr>
               <a:t>Алгоритм полного перебора</a:t>
             </a:r>
           </a:p>
@@ -22597,7 +22685,9 @@
           <a:lstStyle/>
           <a:p>
             <a:r>
-              <a:rPr lang="ru-RU" dirty="0"/>
+              <a:rPr lang="ru-RU" dirty="0">
+                <a:latin typeface="Garamond" panose="02020404030301010803" pitchFamily="18" charset="0"/>
+              </a:rPr>
               <a:t>Муравьиный алгоритм</a:t>
             </a:r>
           </a:p>
@@ -22625,7 +22715,9 @@
           <a:lstStyle/>
           <a:p>
             <a:r>
-              <a:rPr lang="ru-RU" dirty="0"/>
+              <a:rPr lang="ru-RU" dirty="0">
+                <a:latin typeface="Garamond" panose="02020404030301010803" pitchFamily="18" charset="0"/>
+              </a:rPr>
               <a:t>Алгоритм имитации отжига</a:t>
             </a:r>
           </a:p>
@@ -22653,8 +22745,22 @@
           <a:lstStyle/>
           <a:p>
             <a:r>
-              <a:rPr lang="ru-RU" dirty="0"/>
-              <a:t>Алгоритм</a:t>
+              <a:rPr lang="ru-RU" dirty="0">
+                <a:latin typeface="Garamond" panose="02020404030301010803" pitchFamily="18" charset="0"/>
+              </a:rPr>
+              <a:t>Генетический</a:t>
+            </a:r>
+            <a:r>
+              <a:rPr lang="en-US" dirty="0">
+                <a:latin typeface="Garamond" panose="02020404030301010803" pitchFamily="18" charset="0"/>
+              </a:rPr>
+              <a:t> </a:t>
+            </a:r>
+            <a:r>
+              <a:rPr lang="ru-RU" dirty="0">
+                <a:latin typeface="Garamond" panose="02020404030301010803" pitchFamily="18" charset="0"/>
+              </a:rPr>
+              <a:t>алгоритм</a:t>
             </a:r>
           </a:p>
         </p:txBody>
@@ -22835,13 +22941,20 @@
             <p:ph type="title"/>
           </p:nvPr>
         </p:nvSpPr>
-        <p:spPr/>
+        <p:spPr>
+          <a:xfrm>
+            <a:off x="5476875" y="1671639"/>
+            <a:ext cx="5470046" cy="1204912"/>
+          </a:xfrm>
+        </p:spPr>
         <p:txBody>
           <a:bodyPr/>
           <a:lstStyle/>
           <a:p>
             <a:r>
-              <a:rPr lang="ru-RU" cap="none" dirty="0"/>
+              <a:rPr lang="ru-RU" cap="none" dirty="0">
+                <a:latin typeface="Garamond" panose="02020404030301010803" pitchFamily="18" charset="0"/>
+              </a:rPr>
               <a:t>Алгоритм полного перебора</a:t>
             </a:r>
           </a:p>
@@ -22863,12 +22976,17 @@
             <p:ph type="body" idx="1"/>
           </p:nvPr>
         </p:nvSpPr>
-        <p:spPr/>
+        <p:spPr>
+          <a:xfrm>
+            <a:off x="5476874" y="3682546"/>
+            <a:ext cx="5470045" cy="1525588"/>
+          </a:xfrm>
+        </p:spPr>
         <p:txBody>
           <a:bodyPr/>
           <a:lstStyle/>
           <a:p>
-            <a:endParaRPr lang="ru-RU"/>
+            <a:endParaRPr lang="ru-RU" dirty="0"/>
           </a:p>
         </p:txBody>
       </p:sp>
@@ -23012,7 +23130,9 @@
           <a:lstStyle/>
           <a:p>
             <a:r>
-              <a:rPr lang="ru-RU" cap="none" dirty="0"/>
+              <a:rPr lang="ru-RU" cap="none" dirty="0">
+                <a:latin typeface="Garamond" panose="02020404030301010803" pitchFamily="18" charset="0"/>
+              </a:rPr>
               <a:t>Муравьиный алгоритм</a:t>
             </a:r>
           </a:p>
@@ -23183,7 +23303,9 @@
           <a:lstStyle/>
           <a:p>
             <a:r>
-              <a:rPr lang="ru-RU" cap="none" dirty="0"/>
+              <a:rPr lang="ru-RU" cap="none" dirty="0">
+                <a:latin typeface="Garamond" panose="02020404030301010803" pitchFamily="18" charset="0"/>
+              </a:rPr>
               <a:t>Алгоритм имитации отжига</a:t>
             </a:r>
           </a:p>
@@ -24107,6 +24229,34 @@
 </file>
 
 <file path=customXml/item1.xml><?xml version="1.0" encoding="utf-8"?>
+<?mso-contentType ?>
+<FormTemplates xmlns="http://schemas.microsoft.com/sharepoint/v3/contenttype/forms">
+  <Display>DocumentLibraryForm</Display>
+  <Edit>DocumentLibraryForm</Edit>
+  <New>DocumentLibraryForm</New>
+</FormTemplates>
+</file>
+
+<file path=customXml/item2.xml><?xml version="1.0" encoding="utf-8"?>
+<p:properties xmlns:p="http://schemas.microsoft.com/office/2006/metadata/properties" xmlns:xsi="http://www.w3.org/2001/XMLSchema-instance" xmlns:pc="http://schemas.microsoft.com/office/infopath/2007/PartnerControls">
+  <documentManagement>
+    <_ip_UnifiedCompliancePolicyUIAction xmlns="http://schemas.microsoft.com/sharepoint/v3" xsi:nil="true"/>
+    <Image xmlns="71af3243-3dd4-4a8d-8c0d-dd76da1f02a5">
+      <Url xsi:nil="true"/>
+      <Description xsi:nil="true"/>
+    </Image>
+    <Status xmlns="71af3243-3dd4-4a8d-8c0d-dd76da1f02a5">Not started</Status>
+    <_ip_UnifiedCompliancePolicyProperties xmlns="http://schemas.microsoft.com/sharepoint/v3" xsi:nil="true"/>
+    <ImageTagsTaxHTField xmlns="71af3243-3dd4-4a8d-8c0d-dd76da1f02a5">
+      <Terms xmlns="http://schemas.microsoft.com/office/infopath/2007/PartnerControls"/>
+    </ImageTagsTaxHTField>
+    <TaxCatchAll xmlns="230e9df3-be65-4c73-a93b-d1236ebd677e"/>
+    <MediaServiceKeyPoints xmlns="71af3243-3dd4-4a8d-8c0d-dd76da1f02a5" xsi:nil="true"/>
+  </documentManagement>
+</p:properties>
+</file>
+
+<file path=customXml/item3.xml><?xml version="1.0" encoding="utf-8"?>
 <ct:contentTypeSchema xmlns:ct="http://schemas.microsoft.com/office/2006/metadata/contentType" xmlns:ma="http://schemas.microsoft.com/office/2006/metadata/properties/metaAttributes" ct:_="" ma:_="" ma:contentTypeName="Document" ma:contentTypeID="0x01010079F111ED35F8CC479449609E8A0923A6" ma:contentTypeVersion="20" ma:contentTypeDescription="Create a new document." ma:contentTypeScope="" ma:versionID="1267097ee5f5874adfcc408041ae252e">
   <xsd:schema xmlns:xsd="http://www.w3.org/2001/XMLSchema" xmlns:xs="http://www.w3.org/2001/XMLSchema" xmlns:p="http://schemas.microsoft.com/office/2006/metadata/properties" xmlns:ns1="http://schemas.microsoft.com/sharepoint/v3" xmlns:ns2="71af3243-3dd4-4a8d-8c0d-dd76da1f02a5" xmlns:ns3="16c05727-aa75-4e4a-9b5f-8a80a1165891" xmlns:ns4="230e9df3-be65-4c73-a93b-d1236ebd677e" targetNamespace="http://schemas.microsoft.com/office/2006/metadata/properties" ma:root="true" ma:fieldsID="395891a93df65b14727750f2c06c306c" ns1:_="" ns2:_="" ns3:_="" ns4:_="">
     <xsd:import namespace="http://schemas.microsoft.com/sharepoint/v3"/>
@@ -24382,35 +24532,27 @@
 </ct:contentTypeSchema>
 </file>
 
-<file path=customXml/item2.xml><?xml version="1.0" encoding="utf-8"?>
-<p:properties xmlns:p="http://schemas.microsoft.com/office/2006/metadata/properties" xmlns:xsi="http://www.w3.org/2001/XMLSchema-instance" xmlns:pc="http://schemas.microsoft.com/office/infopath/2007/PartnerControls">
-  <documentManagement>
-    <_ip_UnifiedCompliancePolicyUIAction xmlns="http://schemas.microsoft.com/sharepoint/v3" xsi:nil="true"/>
-    <Image xmlns="71af3243-3dd4-4a8d-8c0d-dd76da1f02a5">
-      <Url xsi:nil="true"/>
-      <Description xsi:nil="true"/>
-    </Image>
-    <Status xmlns="71af3243-3dd4-4a8d-8c0d-dd76da1f02a5">Not started</Status>
-    <_ip_UnifiedCompliancePolicyProperties xmlns="http://schemas.microsoft.com/sharepoint/v3" xsi:nil="true"/>
-    <ImageTagsTaxHTField xmlns="71af3243-3dd4-4a8d-8c0d-dd76da1f02a5">
-      <Terms xmlns="http://schemas.microsoft.com/office/infopath/2007/PartnerControls"/>
-    </ImageTagsTaxHTField>
-    <TaxCatchAll xmlns="230e9df3-be65-4c73-a93b-d1236ebd677e"/>
-    <MediaServiceKeyPoints xmlns="71af3243-3dd4-4a8d-8c0d-dd76da1f02a5" xsi:nil="true"/>
-  </documentManagement>
-</p:properties>
+<file path=customXml/itemProps1.xml><?xml version="1.0" encoding="utf-8"?>
+<ds:datastoreItem xmlns:ds="http://schemas.openxmlformats.org/officeDocument/2006/customXml" ds:itemID="{42BC90D6-94CF-42F7-AAC4-9CF6824C54D5}">
+  <ds:schemaRefs>
+    <ds:schemaRef ds:uri="http://schemas.microsoft.com/sharepoint/v3/contenttype/forms"/>
+  </ds:schemaRefs>
+</ds:datastoreItem>
 </file>
 
-<file path=customXml/item3.xml><?xml version="1.0" encoding="utf-8"?>
-<?mso-contentType ?>
-<FormTemplates xmlns="http://schemas.microsoft.com/sharepoint/v3/contenttype/forms">
-  <Display>DocumentLibraryForm</Display>
-  <Edit>DocumentLibraryForm</Edit>
-  <New>DocumentLibraryForm</New>
-</FormTemplates>
+<file path=customXml/itemProps2.xml><?xml version="1.0" encoding="utf-8"?>
+<ds:datastoreItem xmlns:ds="http://schemas.openxmlformats.org/officeDocument/2006/customXml" ds:itemID="{7F97B18F-50BC-4F30-8373-93489E845F83}">
+  <ds:schemaRefs>
+    <ds:schemaRef ds:uri="http://schemas.microsoft.com/office/2006/metadata/properties"/>
+    <ds:schemaRef ds:uri="http://schemas.microsoft.com/office/infopath/2007/PartnerControls"/>
+    <ds:schemaRef ds:uri="http://schemas.microsoft.com/sharepoint/v3"/>
+    <ds:schemaRef ds:uri="71af3243-3dd4-4a8d-8c0d-dd76da1f02a5"/>
+    <ds:schemaRef ds:uri="230e9df3-be65-4c73-a93b-d1236ebd677e"/>
+  </ds:schemaRefs>
+</ds:datastoreItem>
 </file>
 
-<file path=customXml/itemProps1.xml><?xml version="1.0" encoding="utf-8"?>
+<file path=customXml/itemProps3.xml><?xml version="1.0" encoding="utf-8"?>
 <ds:datastoreItem xmlns:ds="http://schemas.openxmlformats.org/officeDocument/2006/customXml" ds:itemID="{64CF2EF3-001F-4BE9-81B3-86ECBBF9425F}">
   <ds:schemaRefs>
     <ds:schemaRef ds:uri="http://schemas.microsoft.com/office/2006/metadata/contentType"/>
@@ -24431,26 +24573,6 @@
 </ds:datastoreItem>
 </file>
 
-<file path=customXml/itemProps2.xml><?xml version="1.0" encoding="utf-8"?>
-<ds:datastoreItem xmlns:ds="http://schemas.openxmlformats.org/officeDocument/2006/customXml" ds:itemID="{7F97B18F-50BC-4F30-8373-93489E845F83}">
-  <ds:schemaRefs>
-    <ds:schemaRef ds:uri="http://schemas.microsoft.com/office/2006/metadata/properties"/>
-    <ds:schemaRef ds:uri="http://schemas.microsoft.com/office/infopath/2007/PartnerControls"/>
-    <ds:schemaRef ds:uri="http://schemas.microsoft.com/sharepoint/v3"/>
-    <ds:schemaRef ds:uri="71af3243-3dd4-4a8d-8c0d-dd76da1f02a5"/>
-    <ds:schemaRef ds:uri="230e9df3-be65-4c73-a93b-d1236ebd677e"/>
-  </ds:schemaRefs>
-</ds:datastoreItem>
-</file>
-
-<file path=customXml/itemProps3.xml><?xml version="1.0" encoding="utf-8"?>
-<ds:datastoreItem xmlns:ds="http://schemas.openxmlformats.org/officeDocument/2006/customXml" ds:itemID="{42BC90D6-94CF-42F7-AAC4-9CF6824C54D5}">
-  <ds:schemaRefs>
-    <ds:schemaRef ds:uri="http://schemas.microsoft.com/sharepoint/v3/contenttype/forms"/>
-  </ds:schemaRefs>
-</ds:datastoreItem>
-</file>
-
 <file path=docMetadata/LabelInfo.xml><?xml version="1.0" encoding="utf-8"?>
 <clbl:labelList xmlns:clbl="http://schemas.microsoft.com/office/2020/mipLabelMetadata">
   <clbl:label id="{f42aa342-8706-4288-bd11-ebb85995028c}" enabled="1" method="Standard" siteId="{72f988bf-86f1-41af-91ab-2d7cd011db47}" removed="0"/>

</xml_diff>